<commit_message>
revise: updates to Weekly Report
</commit_message>
<xml_diff>
--- a/docs/WeeklyUpdates/WeeklyUpdate_Nov2-6.pptx
+++ b/docs/WeeklyUpdates/WeeklyUpdate_Nov2-6.pptx
@@ -3949,8 +3949,8 @@
         </p:nvSpPr>
         <p:spPr>
           <a:xfrm>
-            <a:off x="266700" y="2286000"/>
-            <a:ext cx="8382000" cy="2667000"/>
+            <a:off x="266700" y="2285999"/>
+            <a:ext cx="8382000" cy="3521075"/>
           </a:xfrm>
           <a:prstGeom prst="rect">
             <a:avLst/>
@@ -4102,14 +4102,13 @@
               <a:lnSpc>
                 <a:spcPct val="200000"/>
               </a:lnSpc>
-              <a:buFont typeface="Arial" pitchFamily="34" charset="0"/>
               <a:buNone/>
             </a:pPr>
             <a:r>
-              <a:rPr lang="en-US" altLang="ja-JP" sz="1600" dirty="0">
+              <a:rPr lang="en-US" altLang="en-US" sz="1600" i="1" dirty="0">
                 <a:ea typeface="ＭＳ Ｐゴシック" pitchFamily="34" charset="-128"/>
               </a:rPr>
-              <a:t>&lt;Team Name&gt;</a:t>
+              <a:t>Team Name In Discussion</a:t>
             </a:r>
           </a:p>
           <a:p>
@@ -4186,7 +4185,7 @@
               <a:rPr lang="en-US" altLang="en-US" sz="1600" dirty="0">
                 <a:ea typeface="ＭＳ Ｐゴシック" pitchFamily="34" charset="-128"/>
               </a:rPr>
-              <a:t>Bill Michael</a:t>
+              <a:t>Mr. Bill Michael</a:t>
             </a:r>
           </a:p>
           <a:p>

</xml_diff>